<commit_message>
add ongoing processes and in-emergency tabs
</commit_message>
<xml_diff>
--- a/flowDiagrams.pptx
+++ b/flowDiagrams.pptx
@@ -6,6 +6,8 @@
   </p:sldMasterIdLst>
   <p:sldIdLst>
     <p:sldId id="257" r:id="rId2"/>
+    <p:sldId id="260" r:id="rId3"/>
+    <p:sldId id="261" r:id="rId4"/>
   </p:sldIdLst>
   <p:sldSz cx="12192000" cy="6858000"/>
   <p:notesSz cx="6858000" cy="9144000"/>
@@ -3824,6 +3826,333 @@
 </p:sld>
 </file>
 
+<file path=ppt/slides/slide2.xml><?xml version="1.0" encoding="utf-8"?>
+<p:sld xmlns:a="http://schemas.openxmlformats.org/drawingml/2006/main" xmlns:r="http://schemas.openxmlformats.org/officeDocument/2006/relationships" xmlns:p="http://schemas.openxmlformats.org/presentationml/2006/main">
+  <p:cSld>
+    <p:spTree>
+      <p:nvGrpSpPr>
+        <p:cNvPr id="1" name=""/>
+        <p:cNvGrpSpPr/>
+        <p:nvPr/>
+      </p:nvGrpSpPr>
+      <p:grpSpPr>
+        <a:xfrm>
+          <a:off x="0" y="0"/>
+          <a:ext cx="0" cy="0"/>
+          <a:chOff x="0" y="0"/>
+          <a:chExt cx="0" cy="0"/>
+        </a:xfrm>
+      </p:grpSpPr>
+      <p:sp>
+        <p:nvSpPr>
+          <p:cNvPr id="2" name="Title 1">
+            <a:extLst>
+              <a:ext uri="{FF2B5EF4-FFF2-40B4-BE49-F238E27FC236}">
+                <a16:creationId xmlns:a16="http://schemas.microsoft.com/office/drawing/2014/main" id="{F3DD1018-67E7-E242-A964-DD31C1BA7458}"/>
+              </a:ext>
+            </a:extLst>
+          </p:cNvPr>
+          <p:cNvSpPr>
+            <a:spLocks noGrp="1"/>
+          </p:cNvSpPr>
+          <p:nvPr>
+            <p:ph type="title"/>
+          </p:nvPr>
+        </p:nvSpPr>
+        <p:spPr>
+          <a:xfrm>
+            <a:off x="720635" y="0"/>
+            <a:ext cx="10515600" cy="1018903"/>
+          </a:xfrm>
+        </p:spPr>
+        <p:txBody>
+          <a:bodyPr/>
+          <a:lstStyle/>
+          <a:p>
+            <a:r>
+              <a:rPr lang="en-US" dirty="0"/>
+              <a:t>Ongoing processes</a:t>
+            </a:r>
+          </a:p>
+        </p:txBody>
+      </p:sp>
+      <p:sp>
+        <p:nvSpPr>
+          <p:cNvPr id="3" name="Content Placeholder 2">
+            <a:extLst>
+              <a:ext uri="{FF2B5EF4-FFF2-40B4-BE49-F238E27FC236}">
+                <a16:creationId xmlns:a16="http://schemas.microsoft.com/office/drawing/2014/main" id="{94270BB8-E587-9B49-9064-ACA9F33C8505}"/>
+              </a:ext>
+            </a:extLst>
+          </p:cNvPr>
+          <p:cNvSpPr>
+            <a:spLocks noGrp="1"/>
+          </p:cNvSpPr>
+          <p:nvPr>
+            <p:ph idx="1"/>
+          </p:nvPr>
+        </p:nvSpPr>
+        <p:spPr>
+          <a:xfrm>
+            <a:off x="838200" y="1018903"/>
+            <a:ext cx="10515600" cy="5158060"/>
+          </a:xfrm>
+        </p:spPr>
+        <p:txBody>
+          <a:bodyPr/>
+          <a:lstStyle/>
+          <a:p>
+            <a:r>
+              <a:rPr lang="en-US" dirty="0"/>
+              <a:t>‘nudge’ for preparedness, </a:t>
+            </a:r>
+            <a:r>
+              <a:rPr lang="en-US" dirty="0" err="1"/>
+              <a:t>eg.</a:t>
+            </a:r>
+            <a:endParaRPr lang="en-US" dirty="0"/>
+          </a:p>
+          <a:p>
+            <a:pPr lvl="1"/>
+            <a:r>
+              <a:rPr lang="en-US" dirty="0"/>
+              <a:t>Gutter cleaning</a:t>
+            </a:r>
+          </a:p>
+          <a:p>
+            <a:pPr lvl="1"/>
+            <a:r>
+              <a:rPr lang="en-US" dirty="0"/>
+              <a:t>Pump/sprinkler testing</a:t>
+            </a:r>
+          </a:p>
+          <a:p>
+            <a:pPr lvl="1"/>
+            <a:r>
+              <a:rPr lang="en-US" dirty="0"/>
+              <a:t>Reconnaissance of potential escape routes</a:t>
+            </a:r>
+          </a:p>
+          <a:p>
+            <a:pPr lvl="2"/>
+            <a:r>
+              <a:rPr lang="en-US" dirty="0"/>
+              <a:t>Geocaching as an incentive (gamification) mean</a:t>
+            </a:r>
+          </a:p>
+          <a:p>
+            <a:r>
+              <a:rPr lang="en-US" dirty="0"/>
+              <a:t>Social media integration to help build relationships and plans with </a:t>
+            </a:r>
+            <a:r>
+              <a:rPr lang="en-US" dirty="0" err="1"/>
+              <a:t>neighbours</a:t>
+            </a:r>
+            <a:r>
+              <a:rPr lang="en-US" dirty="0"/>
+              <a:t>, </a:t>
+            </a:r>
+            <a:r>
+              <a:rPr lang="en-US" dirty="0" err="1"/>
+              <a:t>eg.</a:t>
+            </a:r>
+            <a:r>
+              <a:rPr lang="en-US" dirty="0"/>
+              <a:t> Awareness of others’</a:t>
+            </a:r>
+          </a:p>
+          <a:p>
+            <a:pPr lvl="1"/>
+            <a:r>
+              <a:rPr lang="en-US" dirty="0"/>
+              <a:t>Habits</a:t>
+            </a:r>
+          </a:p>
+          <a:p>
+            <a:pPr lvl="1"/>
+            <a:r>
+              <a:rPr lang="en-US" dirty="0"/>
+              <a:t>Strategies</a:t>
+            </a:r>
+          </a:p>
+          <a:p>
+            <a:pPr lvl="1"/>
+            <a:r>
+              <a:rPr lang="en-US" dirty="0"/>
+              <a:t>Limitations (</a:t>
+            </a:r>
+            <a:r>
+              <a:rPr lang="en-US" dirty="0" err="1"/>
+              <a:t>eg.</a:t>
+            </a:r>
+            <a:r>
+              <a:rPr lang="en-US" dirty="0"/>
+              <a:t> physical impairment, dependents: children, elderly, pets, </a:t>
+            </a:r>
+            <a:r>
+              <a:rPr lang="en-US" dirty="0" err="1"/>
+              <a:t>etc</a:t>
+            </a:r>
+            <a:r>
+              <a:rPr lang="en-US" dirty="0"/>
+              <a:t>). In an emergency situation connections with </a:t>
+            </a:r>
+            <a:r>
+              <a:rPr lang="en-US" dirty="0" err="1"/>
+              <a:t>neighbours</a:t>
+            </a:r>
+            <a:r>
+              <a:rPr lang="en-US" dirty="0"/>
+              <a:t> may be used to help nudge safe </a:t>
+            </a:r>
+            <a:r>
+              <a:rPr lang="en-US" dirty="0" err="1"/>
+              <a:t>behaviour</a:t>
+            </a:r>
+            <a:r>
+              <a:rPr lang="en-US" dirty="0"/>
+              <a:t> (</a:t>
+            </a:r>
+            <a:r>
+              <a:rPr lang="en-US" dirty="0" err="1"/>
+              <a:t>eg.</a:t>
+            </a:r>
+            <a:r>
+              <a:rPr lang="en-US" dirty="0"/>
+              <a:t> “90% of your </a:t>
+            </a:r>
+            <a:r>
+              <a:rPr lang="en-US" dirty="0" err="1"/>
+              <a:t>neighbours</a:t>
+            </a:r>
+            <a:r>
+              <a:rPr lang="en-US" dirty="0"/>
+              <a:t> have already evacuated”)</a:t>
+            </a:r>
+          </a:p>
+        </p:txBody>
+      </p:sp>
+    </p:spTree>
+    <p:extLst>
+      <p:ext uri="{BB962C8B-B14F-4D97-AF65-F5344CB8AC3E}">
+        <p14:creationId xmlns:p14="http://schemas.microsoft.com/office/powerpoint/2010/main" val="57976308"/>
+      </p:ext>
+    </p:extLst>
+  </p:cSld>
+  <p:clrMapOvr>
+    <a:masterClrMapping/>
+  </p:clrMapOvr>
+</p:sld>
+</file>
+
+<file path=ppt/slides/slide3.xml><?xml version="1.0" encoding="utf-8"?>
+<p:sld xmlns:a="http://schemas.openxmlformats.org/drawingml/2006/main" xmlns:r="http://schemas.openxmlformats.org/officeDocument/2006/relationships" xmlns:p="http://schemas.openxmlformats.org/presentationml/2006/main">
+  <p:cSld>
+    <p:spTree>
+      <p:nvGrpSpPr>
+        <p:cNvPr id="1" name=""/>
+        <p:cNvGrpSpPr/>
+        <p:nvPr/>
+      </p:nvGrpSpPr>
+      <p:grpSpPr>
+        <a:xfrm>
+          <a:off x="0" y="0"/>
+          <a:ext cx="0" cy="0"/>
+          <a:chOff x="0" y="0"/>
+          <a:chExt cx="0" cy="0"/>
+        </a:xfrm>
+      </p:grpSpPr>
+      <p:sp>
+        <p:nvSpPr>
+          <p:cNvPr id="2" name="Title 1">
+            <a:extLst>
+              <a:ext uri="{FF2B5EF4-FFF2-40B4-BE49-F238E27FC236}">
+                <a16:creationId xmlns:a16="http://schemas.microsoft.com/office/drawing/2014/main" id="{F3DD1018-67E7-E242-A964-DD31C1BA7458}"/>
+              </a:ext>
+            </a:extLst>
+          </p:cNvPr>
+          <p:cNvSpPr>
+            <a:spLocks noGrp="1"/>
+          </p:cNvSpPr>
+          <p:nvPr>
+            <p:ph type="title"/>
+          </p:nvPr>
+        </p:nvSpPr>
+        <p:spPr>
+          <a:xfrm>
+            <a:off x="720635" y="0"/>
+            <a:ext cx="10515600" cy="1018903"/>
+          </a:xfrm>
+        </p:spPr>
+        <p:txBody>
+          <a:bodyPr/>
+          <a:lstStyle/>
+          <a:p>
+            <a:r>
+              <a:rPr lang="en-US" dirty="0"/>
+              <a:t>In an emergency</a:t>
+            </a:r>
+          </a:p>
+        </p:txBody>
+      </p:sp>
+      <p:sp>
+        <p:nvSpPr>
+          <p:cNvPr id="3" name="Content Placeholder 2">
+            <a:extLst>
+              <a:ext uri="{FF2B5EF4-FFF2-40B4-BE49-F238E27FC236}">
+                <a16:creationId xmlns:a16="http://schemas.microsoft.com/office/drawing/2014/main" id="{94270BB8-E587-9B49-9064-ACA9F33C8505}"/>
+              </a:ext>
+            </a:extLst>
+          </p:cNvPr>
+          <p:cNvSpPr>
+            <a:spLocks noGrp="1"/>
+          </p:cNvSpPr>
+          <p:nvPr>
+            <p:ph idx="1"/>
+          </p:nvPr>
+        </p:nvSpPr>
+        <p:spPr>
+          <a:xfrm>
+            <a:off x="838200" y="1018903"/>
+            <a:ext cx="10515600" cy="5158060"/>
+          </a:xfrm>
+        </p:spPr>
+        <p:txBody>
+          <a:bodyPr/>
+          <a:lstStyle/>
+          <a:p>
+            <a:r>
+              <a:rPr lang="en-US" dirty="0"/>
+              <a:t>Update escape routes advice as situation evolves</a:t>
+            </a:r>
+          </a:p>
+          <a:p>
+            <a:r>
+              <a:rPr lang="en-US" dirty="0"/>
+              <a:t>Provide advice on likely arrival time of fire and suggest </a:t>
+            </a:r>
+            <a:r>
+              <a:rPr lang="en-US"/>
+              <a:t>action deadlines</a:t>
+            </a:r>
+            <a:endParaRPr lang="en-US" dirty="0"/>
+          </a:p>
+        </p:txBody>
+      </p:sp>
+    </p:spTree>
+    <p:extLst>
+      <p:ext uri="{BB962C8B-B14F-4D97-AF65-F5344CB8AC3E}">
+        <p14:creationId xmlns:p14="http://schemas.microsoft.com/office/powerpoint/2010/main" val="1766827484"/>
+      </p:ext>
+    </p:extLst>
+  </p:cSld>
+  <p:clrMapOvr>
+    <a:masterClrMapping/>
+  </p:clrMapOvr>
+</p:sld>
+</file>
+
 <file path=ppt/theme/theme1.xml><?xml version="1.0" encoding="utf-8"?>
 <a:theme xmlns:a="http://schemas.openxmlformats.org/drawingml/2006/main" name="Office Theme">
   <a:themeElements>

</xml_diff>